<commit_message>
classes in good form
</commit_message>
<xml_diff>
--- a/class_metods_list.pptx
+++ b/class_metods_list.pptx
@@ -5,7 +5,7 @@
     <p:sldMasterId id="2147483648" r:id="rId1"/>
   </p:sldMasterIdLst>
   <p:sldIdLst>
-    <p:sldId id="256" r:id="rId2"/>
+    <p:sldId id="257" r:id="rId2"/>
   </p:sldIdLst>
   <p:sldSz cx="9144000" cy="6858000" type="screen4x3"/>
   <p:notesSz cx="6858000" cy="9144000"/>
@@ -289,7 +289,7 @@
             <a:fld id="{94A9B0C0-E54A-4235-9AD7-DC0DEEE87367}" type="datetimeFigureOut">
               <a:rPr lang="ru-RU" smtClean="0"/>
               <a:pPr/>
-              <a:t>20.04.2015</a:t>
+              <a:t>21.04.2015</a:t>
             </a:fld>
             <a:endParaRPr lang="ru-RU"/>
           </a:p>
@@ -456,7 +456,7 @@
             <a:fld id="{94A9B0C0-E54A-4235-9AD7-DC0DEEE87367}" type="datetimeFigureOut">
               <a:rPr lang="ru-RU" smtClean="0"/>
               <a:pPr/>
-              <a:t>20.04.2015</a:t>
+              <a:t>21.04.2015</a:t>
             </a:fld>
             <a:endParaRPr lang="ru-RU"/>
           </a:p>
@@ -633,7 +633,7 @@
             <a:fld id="{94A9B0C0-E54A-4235-9AD7-DC0DEEE87367}" type="datetimeFigureOut">
               <a:rPr lang="ru-RU" smtClean="0"/>
               <a:pPr/>
-              <a:t>20.04.2015</a:t>
+              <a:t>21.04.2015</a:t>
             </a:fld>
             <a:endParaRPr lang="ru-RU"/>
           </a:p>
@@ -800,7 +800,7 @@
             <a:fld id="{94A9B0C0-E54A-4235-9AD7-DC0DEEE87367}" type="datetimeFigureOut">
               <a:rPr lang="ru-RU" smtClean="0"/>
               <a:pPr/>
-              <a:t>20.04.2015</a:t>
+              <a:t>21.04.2015</a:t>
             </a:fld>
             <a:endParaRPr lang="ru-RU"/>
           </a:p>
@@ -1043,7 +1043,7 @@
             <a:fld id="{94A9B0C0-E54A-4235-9AD7-DC0DEEE87367}" type="datetimeFigureOut">
               <a:rPr lang="ru-RU" smtClean="0"/>
               <a:pPr/>
-              <a:t>20.04.2015</a:t>
+              <a:t>21.04.2015</a:t>
             </a:fld>
             <a:endParaRPr lang="ru-RU"/>
           </a:p>
@@ -1328,7 +1328,7 @@
             <a:fld id="{94A9B0C0-E54A-4235-9AD7-DC0DEEE87367}" type="datetimeFigureOut">
               <a:rPr lang="ru-RU" smtClean="0"/>
               <a:pPr/>
-              <a:t>20.04.2015</a:t>
+              <a:t>21.04.2015</a:t>
             </a:fld>
             <a:endParaRPr lang="ru-RU"/>
           </a:p>
@@ -1747,7 +1747,7 @@
             <a:fld id="{94A9B0C0-E54A-4235-9AD7-DC0DEEE87367}" type="datetimeFigureOut">
               <a:rPr lang="ru-RU" smtClean="0"/>
               <a:pPr/>
-              <a:t>20.04.2015</a:t>
+              <a:t>21.04.2015</a:t>
             </a:fld>
             <a:endParaRPr lang="ru-RU"/>
           </a:p>
@@ -1862,7 +1862,7 @@
             <a:fld id="{94A9B0C0-E54A-4235-9AD7-DC0DEEE87367}" type="datetimeFigureOut">
               <a:rPr lang="ru-RU" smtClean="0"/>
               <a:pPr/>
-              <a:t>20.04.2015</a:t>
+              <a:t>21.04.2015</a:t>
             </a:fld>
             <a:endParaRPr lang="ru-RU"/>
           </a:p>
@@ -1954,7 +1954,7 @@
             <a:fld id="{94A9B0C0-E54A-4235-9AD7-DC0DEEE87367}" type="datetimeFigureOut">
               <a:rPr lang="ru-RU" smtClean="0"/>
               <a:pPr/>
-              <a:t>20.04.2015</a:t>
+              <a:t>21.04.2015</a:t>
             </a:fld>
             <a:endParaRPr lang="ru-RU"/>
           </a:p>
@@ -2228,7 +2228,7 @@
             <a:fld id="{94A9B0C0-E54A-4235-9AD7-DC0DEEE87367}" type="datetimeFigureOut">
               <a:rPr lang="ru-RU" smtClean="0"/>
               <a:pPr/>
-              <a:t>20.04.2015</a:t>
+              <a:t>21.04.2015</a:t>
             </a:fld>
             <a:endParaRPr lang="ru-RU"/>
           </a:p>
@@ -2478,7 +2478,7 @@
             <a:fld id="{94A9B0C0-E54A-4235-9AD7-DC0DEEE87367}" type="datetimeFigureOut">
               <a:rPr lang="ru-RU" smtClean="0"/>
               <a:pPr/>
-              <a:t>20.04.2015</a:t>
+              <a:t>21.04.2015</a:t>
             </a:fld>
             <a:endParaRPr lang="ru-RU"/>
           </a:p>
@@ -2688,7 +2688,7 @@
             <a:fld id="{94A9B0C0-E54A-4235-9AD7-DC0DEEE87367}" type="datetimeFigureOut">
               <a:rPr lang="ru-RU" smtClean="0"/>
               <a:pPr/>
-              <a:t>20.04.2015</a:t>
+              <a:t>21.04.2015</a:t>
             </a:fld>
             <a:endParaRPr lang="ru-RU"/>
           </a:p>
@@ -3067,8 +3067,1041 @@
         </p:nvSpPr>
         <p:spPr>
           <a:xfrm>
-            <a:off x="0" y="0"/>
-            <a:ext cx="4392488" cy="4462760"/>
+            <a:off x="3563888" y="620688"/>
+            <a:ext cx="1512168" cy="369332"/>
+          </a:xfrm>
+          <a:prstGeom prst="rect">
+            <a:avLst/>
+          </a:prstGeom>
+        </p:spPr>
+        <p:style>
+          <a:lnRef idx="2">
+            <a:schemeClr val="accent1"/>
+          </a:lnRef>
+          <a:fillRef idx="1">
+            <a:schemeClr val="lt1"/>
+          </a:fillRef>
+          <a:effectRef idx="0">
+            <a:schemeClr val="accent1"/>
+          </a:effectRef>
+          <a:fontRef idx="minor">
+            <a:schemeClr val="dk1"/>
+          </a:fontRef>
+        </p:style>
+        <p:txBody>
+          <a:bodyPr wrap="square" rtlCol="0">
+            <a:spAutoFit/>
+          </a:bodyPr>
+          <a:lstStyle/>
+          <a:p>
+            <a:r>
+              <a:rPr lang="en-US" dirty="0" smtClean="0"/>
+              <a:t>ACTIVITY</a:t>
+            </a:r>
+            <a:endParaRPr lang="ru-RU" dirty="0"/>
+          </a:p>
+        </p:txBody>
+      </p:sp>
+      <p:sp>
+        <p:nvSpPr>
+          <p:cNvPr id="8" name="TextBox 7"/>
+          <p:cNvSpPr txBox="1"/>
+          <p:nvPr/>
+        </p:nvSpPr>
+        <p:spPr>
+          <a:xfrm>
+            <a:off x="467544" y="764704"/>
+            <a:ext cx="1152128" cy="369332"/>
+          </a:xfrm>
+          <a:prstGeom prst="rect">
+            <a:avLst/>
+          </a:prstGeom>
+        </p:spPr>
+        <p:style>
+          <a:lnRef idx="2">
+            <a:schemeClr val="accent1">
+              <a:shade val="50000"/>
+            </a:schemeClr>
+          </a:lnRef>
+          <a:fillRef idx="1">
+            <a:schemeClr val="accent1"/>
+          </a:fillRef>
+          <a:effectRef idx="0">
+            <a:schemeClr val="accent1"/>
+          </a:effectRef>
+          <a:fontRef idx="minor">
+            <a:schemeClr val="lt1"/>
+          </a:fontRef>
+        </p:style>
+        <p:txBody>
+          <a:bodyPr wrap="square" rtlCol="0">
+            <a:spAutoFit/>
+          </a:bodyPr>
+          <a:lstStyle/>
+          <a:p>
+            <a:r>
+              <a:rPr lang="en-US" dirty="0" err="1" smtClean="0"/>
+              <a:t>EnterReg</a:t>
+            </a:r>
+            <a:endParaRPr lang="ru-RU" dirty="0"/>
+          </a:p>
+        </p:txBody>
+      </p:sp>
+      <p:sp>
+        <p:nvSpPr>
+          <p:cNvPr id="9" name="TextBox 8"/>
+          <p:cNvSpPr txBox="1"/>
+          <p:nvPr/>
+        </p:nvSpPr>
+        <p:spPr>
+          <a:xfrm>
+            <a:off x="395536" y="1700808"/>
+            <a:ext cx="1224136" cy="369332"/>
+          </a:xfrm>
+          <a:prstGeom prst="rect">
+            <a:avLst/>
+          </a:prstGeom>
+        </p:spPr>
+        <p:style>
+          <a:lnRef idx="2">
+            <a:schemeClr val="accent1">
+              <a:shade val="50000"/>
+            </a:schemeClr>
+          </a:lnRef>
+          <a:fillRef idx="1">
+            <a:schemeClr val="accent1"/>
+          </a:fillRef>
+          <a:effectRef idx="0">
+            <a:schemeClr val="accent1"/>
+          </a:effectRef>
+          <a:fontRef idx="minor">
+            <a:schemeClr val="lt1"/>
+          </a:fontRef>
+        </p:style>
+        <p:txBody>
+          <a:bodyPr wrap="square" rtlCol="0">
+            <a:spAutoFit/>
+          </a:bodyPr>
+          <a:lstStyle/>
+          <a:p>
+            <a:r>
+              <a:rPr lang="en-US" dirty="0" err="1" smtClean="0"/>
+              <a:t>EnterLogIn</a:t>
+            </a:r>
+            <a:endParaRPr lang="ru-RU" dirty="0"/>
+          </a:p>
+        </p:txBody>
+      </p:sp>
+      <p:sp>
+        <p:nvSpPr>
+          <p:cNvPr id="10" name="TextBox 9"/>
+          <p:cNvSpPr txBox="1"/>
+          <p:nvPr/>
+        </p:nvSpPr>
+        <p:spPr>
+          <a:xfrm>
+            <a:off x="611560" y="2132856"/>
+            <a:ext cx="1008112" cy="369332"/>
+          </a:xfrm>
+          <a:prstGeom prst="rect">
+            <a:avLst/>
+          </a:prstGeom>
+        </p:spPr>
+        <p:style>
+          <a:lnRef idx="2">
+            <a:schemeClr val="accent1">
+              <a:shade val="50000"/>
+            </a:schemeClr>
+          </a:lnRef>
+          <a:fillRef idx="1">
+            <a:schemeClr val="accent1"/>
+          </a:fillRef>
+          <a:effectRef idx="0">
+            <a:schemeClr val="accent1"/>
+          </a:effectRef>
+          <a:fontRef idx="minor">
+            <a:schemeClr val="lt1"/>
+          </a:fontRef>
+        </p:style>
+        <p:txBody>
+          <a:bodyPr wrap="square" rtlCol="0">
+            <a:spAutoFit/>
+          </a:bodyPr>
+          <a:lstStyle/>
+          <a:p>
+            <a:r>
+              <a:rPr lang="en-US" dirty="0" err="1" smtClean="0"/>
+              <a:t>MyPage</a:t>
+            </a:r>
+            <a:endParaRPr lang="ru-RU" dirty="0"/>
+          </a:p>
+        </p:txBody>
+      </p:sp>
+      <p:sp>
+        <p:nvSpPr>
+          <p:cNvPr id="11" name="TextBox 10"/>
+          <p:cNvSpPr txBox="1"/>
+          <p:nvPr/>
+        </p:nvSpPr>
+        <p:spPr>
+          <a:xfrm>
+            <a:off x="6660232" y="1268760"/>
+            <a:ext cx="1008112" cy="369332"/>
+          </a:xfrm>
+          <a:prstGeom prst="rect">
+            <a:avLst/>
+          </a:prstGeom>
+        </p:spPr>
+        <p:style>
+          <a:lnRef idx="2">
+            <a:schemeClr val="accent1">
+              <a:shade val="50000"/>
+            </a:schemeClr>
+          </a:lnRef>
+          <a:fillRef idx="1">
+            <a:schemeClr val="accent1"/>
+          </a:fillRef>
+          <a:effectRef idx="0">
+            <a:schemeClr val="accent1"/>
+          </a:effectRef>
+          <a:fontRef idx="minor">
+            <a:schemeClr val="lt1"/>
+          </a:fontRef>
+        </p:style>
+        <p:txBody>
+          <a:bodyPr wrap="square" rtlCol="0">
+            <a:spAutoFit/>
+          </a:bodyPr>
+          <a:lstStyle/>
+          <a:p>
+            <a:r>
+              <a:rPr lang="en-US" dirty="0" smtClean="0"/>
+              <a:t>Albums</a:t>
+            </a:r>
+            <a:endParaRPr lang="ru-RU" dirty="0"/>
+          </a:p>
+        </p:txBody>
+      </p:sp>
+      <p:sp>
+        <p:nvSpPr>
+          <p:cNvPr id="12" name="TextBox 11"/>
+          <p:cNvSpPr txBox="1"/>
+          <p:nvPr/>
+        </p:nvSpPr>
+        <p:spPr>
+          <a:xfrm>
+            <a:off x="6660232" y="1772816"/>
+            <a:ext cx="1224136" cy="369332"/>
+          </a:xfrm>
+          <a:prstGeom prst="rect">
+            <a:avLst/>
+          </a:prstGeom>
+        </p:spPr>
+        <p:style>
+          <a:lnRef idx="2">
+            <a:schemeClr val="accent1">
+              <a:shade val="50000"/>
+            </a:schemeClr>
+          </a:lnRef>
+          <a:fillRef idx="1">
+            <a:schemeClr val="accent1"/>
+          </a:fillRef>
+          <a:effectRef idx="0">
+            <a:schemeClr val="accent1"/>
+          </a:effectRef>
+          <a:fontRef idx="minor">
+            <a:schemeClr val="lt1"/>
+          </a:fontRef>
+        </p:style>
+        <p:txBody>
+          <a:bodyPr wrap="square" rtlCol="0">
+            <a:spAutoFit/>
+          </a:bodyPr>
+          <a:lstStyle/>
+          <a:p>
+            <a:r>
+              <a:rPr lang="en-US" dirty="0" smtClean="0"/>
+              <a:t>Messages</a:t>
+            </a:r>
+            <a:endParaRPr lang="ru-RU" dirty="0"/>
+          </a:p>
+        </p:txBody>
+      </p:sp>
+      <p:sp>
+        <p:nvSpPr>
+          <p:cNvPr id="13" name="TextBox 12"/>
+          <p:cNvSpPr txBox="1"/>
+          <p:nvPr/>
+        </p:nvSpPr>
+        <p:spPr>
+          <a:xfrm>
+            <a:off x="251520" y="1268760"/>
+            <a:ext cx="1368152" cy="369332"/>
+          </a:xfrm>
+          <a:prstGeom prst="rect">
+            <a:avLst/>
+          </a:prstGeom>
+        </p:spPr>
+        <p:style>
+          <a:lnRef idx="2">
+            <a:schemeClr val="accent1">
+              <a:shade val="50000"/>
+            </a:schemeClr>
+          </a:lnRef>
+          <a:fillRef idx="1">
+            <a:schemeClr val="accent1"/>
+          </a:fillRef>
+          <a:effectRef idx="0">
+            <a:schemeClr val="accent1"/>
+          </a:effectRef>
+          <a:fontRef idx="minor">
+            <a:schemeClr val="lt1"/>
+          </a:fontRef>
+        </p:style>
+        <p:txBody>
+          <a:bodyPr wrap="square" rtlCol="0">
+            <a:spAutoFit/>
+          </a:bodyPr>
+          <a:lstStyle/>
+          <a:p>
+            <a:r>
+              <a:rPr lang="en-US" dirty="0" smtClean="0"/>
+              <a:t>Meetings</a:t>
+            </a:r>
+            <a:endParaRPr lang="ru-RU" dirty="0"/>
+          </a:p>
+        </p:txBody>
+      </p:sp>
+      <p:sp>
+        <p:nvSpPr>
+          <p:cNvPr id="14" name="TextBox 13"/>
+          <p:cNvSpPr txBox="1"/>
+          <p:nvPr/>
+        </p:nvSpPr>
+        <p:spPr>
+          <a:xfrm>
+            <a:off x="755576" y="2564904"/>
+            <a:ext cx="864096" cy="369332"/>
+          </a:xfrm>
+          <a:prstGeom prst="rect">
+            <a:avLst/>
+          </a:prstGeom>
+        </p:spPr>
+        <p:style>
+          <a:lnRef idx="2">
+            <a:schemeClr val="accent1">
+              <a:shade val="50000"/>
+            </a:schemeClr>
+          </a:lnRef>
+          <a:fillRef idx="1">
+            <a:schemeClr val="accent1"/>
+          </a:fillRef>
+          <a:effectRef idx="0">
+            <a:schemeClr val="accent1"/>
+          </a:effectRef>
+          <a:fontRef idx="minor">
+            <a:schemeClr val="lt1"/>
+          </a:fontRef>
+        </p:style>
+        <p:txBody>
+          <a:bodyPr wrap="square" rtlCol="0">
+            <a:spAutoFit/>
+          </a:bodyPr>
+          <a:lstStyle/>
+          <a:p>
+            <a:r>
+              <a:rPr lang="en-US" dirty="0" err="1" smtClean="0"/>
+              <a:t>ChekIn</a:t>
+            </a:r>
+            <a:endParaRPr lang="ru-RU" dirty="0"/>
+          </a:p>
+        </p:txBody>
+      </p:sp>
+      <p:sp>
+        <p:nvSpPr>
+          <p:cNvPr id="15" name="TextBox 14"/>
+          <p:cNvSpPr txBox="1"/>
+          <p:nvPr/>
+        </p:nvSpPr>
+        <p:spPr>
+          <a:xfrm>
+            <a:off x="6660232" y="764704"/>
+            <a:ext cx="1368152" cy="369332"/>
+          </a:xfrm>
+          <a:prstGeom prst="rect">
+            <a:avLst/>
+          </a:prstGeom>
+        </p:spPr>
+        <p:style>
+          <a:lnRef idx="2">
+            <a:schemeClr val="accent1">
+              <a:shade val="50000"/>
+            </a:schemeClr>
+          </a:lnRef>
+          <a:fillRef idx="1">
+            <a:schemeClr val="accent1"/>
+          </a:fillRef>
+          <a:effectRef idx="0">
+            <a:schemeClr val="accent1"/>
+          </a:effectRef>
+          <a:fontRef idx="minor">
+            <a:schemeClr val="lt1"/>
+          </a:fontRef>
+        </p:style>
+        <p:txBody>
+          <a:bodyPr wrap="square" rtlCol="0">
+            <a:spAutoFit/>
+          </a:bodyPr>
+          <a:lstStyle/>
+          <a:p>
+            <a:r>
+              <a:rPr lang="en-US" dirty="0" err="1" smtClean="0"/>
+              <a:t>EnterPage</a:t>
+            </a:r>
+            <a:endParaRPr lang="ru-RU" dirty="0"/>
+          </a:p>
+        </p:txBody>
+      </p:sp>
+      <p:sp>
+        <p:nvSpPr>
+          <p:cNvPr id="16" name="Прямоугольник 15"/>
+          <p:cNvSpPr/>
+          <p:nvPr/>
+        </p:nvSpPr>
+        <p:spPr>
+          <a:xfrm>
+            <a:off x="6660232" y="2204864"/>
+            <a:ext cx="928780" cy="369332"/>
+          </a:xfrm>
+          <a:prstGeom prst="rect">
+            <a:avLst/>
+          </a:prstGeom>
+        </p:spPr>
+        <p:style>
+          <a:lnRef idx="2">
+            <a:schemeClr val="accent1">
+              <a:shade val="50000"/>
+            </a:schemeClr>
+          </a:lnRef>
+          <a:fillRef idx="1">
+            <a:schemeClr val="accent1"/>
+          </a:fillRef>
+          <a:effectRef idx="0">
+            <a:schemeClr val="accent1"/>
+          </a:effectRef>
+          <a:fontRef idx="minor">
+            <a:schemeClr val="lt1"/>
+          </a:fontRef>
+        </p:style>
+        <p:txBody>
+          <a:bodyPr wrap="none">
+            <a:spAutoFit/>
+          </a:bodyPr>
+          <a:lstStyle/>
+          <a:p>
+            <a:r>
+              <a:rPr lang="en-US" dirty="0" smtClean="0"/>
+              <a:t>Settings</a:t>
+            </a:r>
+            <a:endParaRPr lang="ru-RU" dirty="0"/>
+          </a:p>
+        </p:txBody>
+      </p:sp>
+      <p:sp>
+        <p:nvSpPr>
+          <p:cNvPr id="18" name="Прямоугольник 17"/>
+          <p:cNvSpPr/>
+          <p:nvPr/>
+        </p:nvSpPr>
+        <p:spPr>
+          <a:xfrm>
+            <a:off x="6660232" y="2636912"/>
+            <a:ext cx="872355" cy="369332"/>
+          </a:xfrm>
+          <a:prstGeom prst="rect">
+            <a:avLst/>
+          </a:prstGeom>
+        </p:spPr>
+        <p:style>
+          <a:lnRef idx="2">
+            <a:schemeClr val="accent1">
+              <a:shade val="50000"/>
+            </a:schemeClr>
+          </a:lnRef>
+          <a:fillRef idx="1">
+            <a:schemeClr val="accent1"/>
+          </a:fillRef>
+          <a:effectRef idx="0">
+            <a:schemeClr val="accent1"/>
+          </a:effectRef>
+          <a:fontRef idx="minor">
+            <a:schemeClr val="lt1"/>
+          </a:fontRef>
+        </p:style>
+        <p:txBody>
+          <a:bodyPr wrap="none">
+            <a:spAutoFit/>
+          </a:bodyPr>
+          <a:lstStyle/>
+          <a:p>
+            <a:r>
+              <a:rPr lang="en-US" dirty="0" smtClean="0"/>
+              <a:t>Friends</a:t>
+            </a:r>
+            <a:endParaRPr lang="ru-RU" dirty="0"/>
+          </a:p>
+        </p:txBody>
+      </p:sp>
+      <p:cxnSp>
+        <p:nvCxnSpPr>
+          <p:cNvPr id="20" name="Прямая со стрелкой 19"/>
+          <p:cNvCxnSpPr>
+            <a:stCxn id="8" idx="3"/>
+            <a:endCxn id="4" idx="1"/>
+          </p:cNvCxnSpPr>
+          <p:nvPr/>
+        </p:nvCxnSpPr>
+        <p:spPr>
+          <a:xfrm flipV="1">
+            <a:off x="1619672" y="805354"/>
+            <a:ext cx="1944216" cy="144016"/>
+          </a:xfrm>
+          <a:prstGeom prst="straightConnector1">
+            <a:avLst/>
+          </a:prstGeom>
+          <a:ln>
+            <a:headEnd type="arrow"/>
+            <a:tailEnd type="arrow"/>
+          </a:ln>
+        </p:spPr>
+        <p:style>
+          <a:lnRef idx="1">
+            <a:schemeClr val="accent1"/>
+          </a:lnRef>
+          <a:fillRef idx="0">
+            <a:schemeClr val="accent1"/>
+          </a:fillRef>
+          <a:effectRef idx="0">
+            <a:schemeClr val="accent1"/>
+          </a:effectRef>
+          <a:fontRef idx="minor">
+            <a:schemeClr val="tx1"/>
+          </a:fontRef>
+        </p:style>
+      </p:cxnSp>
+      <p:cxnSp>
+        <p:nvCxnSpPr>
+          <p:cNvPr id="21" name="Прямая со стрелкой 20"/>
+          <p:cNvCxnSpPr>
+            <a:stCxn id="13" idx="3"/>
+            <a:endCxn id="4" idx="1"/>
+          </p:cNvCxnSpPr>
+          <p:nvPr/>
+        </p:nvCxnSpPr>
+        <p:spPr>
+          <a:xfrm flipV="1">
+            <a:off x="1619672" y="805354"/>
+            <a:ext cx="1944216" cy="648072"/>
+          </a:xfrm>
+          <a:prstGeom prst="straightConnector1">
+            <a:avLst/>
+          </a:prstGeom>
+          <a:ln>
+            <a:headEnd type="arrow"/>
+            <a:tailEnd type="arrow"/>
+          </a:ln>
+        </p:spPr>
+        <p:style>
+          <a:lnRef idx="1">
+            <a:schemeClr val="accent1"/>
+          </a:lnRef>
+          <a:fillRef idx="0">
+            <a:schemeClr val="accent1"/>
+          </a:fillRef>
+          <a:effectRef idx="0">
+            <a:schemeClr val="accent1"/>
+          </a:effectRef>
+          <a:fontRef idx="minor">
+            <a:schemeClr val="tx1"/>
+          </a:fontRef>
+        </p:style>
+      </p:cxnSp>
+      <p:cxnSp>
+        <p:nvCxnSpPr>
+          <p:cNvPr id="23" name="Прямая со стрелкой 22"/>
+          <p:cNvCxnSpPr>
+            <a:stCxn id="9" idx="3"/>
+            <a:endCxn id="4" idx="1"/>
+          </p:cNvCxnSpPr>
+          <p:nvPr/>
+        </p:nvCxnSpPr>
+        <p:spPr>
+          <a:xfrm flipV="1">
+            <a:off x="1619672" y="805354"/>
+            <a:ext cx="1944216" cy="1080120"/>
+          </a:xfrm>
+          <a:prstGeom prst="straightConnector1">
+            <a:avLst/>
+          </a:prstGeom>
+          <a:ln>
+            <a:headEnd type="arrow"/>
+            <a:tailEnd type="arrow"/>
+          </a:ln>
+        </p:spPr>
+        <p:style>
+          <a:lnRef idx="1">
+            <a:schemeClr val="accent1"/>
+          </a:lnRef>
+          <a:fillRef idx="0">
+            <a:schemeClr val="accent1"/>
+          </a:fillRef>
+          <a:effectRef idx="0">
+            <a:schemeClr val="accent1"/>
+          </a:effectRef>
+          <a:fontRef idx="minor">
+            <a:schemeClr val="tx1"/>
+          </a:fontRef>
+        </p:style>
+      </p:cxnSp>
+      <p:cxnSp>
+        <p:nvCxnSpPr>
+          <p:cNvPr id="26" name="Прямая со стрелкой 25"/>
+          <p:cNvCxnSpPr>
+            <a:stCxn id="10" idx="3"/>
+            <a:endCxn id="4" idx="1"/>
+          </p:cNvCxnSpPr>
+          <p:nvPr/>
+        </p:nvCxnSpPr>
+        <p:spPr>
+          <a:xfrm flipV="1">
+            <a:off x="1619672" y="805354"/>
+            <a:ext cx="1944216" cy="1512168"/>
+          </a:xfrm>
+          <a:prstGeom prst="straightConnector1">
+            <a:avLst/>
+          </a:prstGeom>
+          <a:ln>
+            <a:headEnd type="arrow"/>
+            <a:tailEnd type="arrow"/>
+          </a:ln>
+        </p:spPr>
+        <p:style>
+          <a:lnRef idx="1">
+            <a:schemeClr val="accent1"/>
+          </a:lnRef>
+          <a:fillRef idx="0">
+            <a:schemeClr val="accent1"/>
+          </a:fillRef>
+          <a:effectRef idx="0">
+            <a:schemeClr val="accent1"/>
+          </a:effectRef>
+          <a:fontRef idx="minor">
+            <a:schemeClr val="tx1"/>
+          </a:fontRef>
+        </p:style>
+      </p:cxnSp>
+      <p:cxnSp>
+        <p:nvCxnSpPr>
+          <p:cNvPr id="28" name="Прямая со стрелкой 27"/>
+          <p:cNvCxnSpPr>
+            <a:stCxn id="14" idx="3"/>
+            <a:endCxn id="4" idx="1"/>
+          </p:cNvCxnSpPr>
+          <p:nvPr/>
+        </p:nvCxnSpPr>
+        <p:spPr>
+          <a:xfrm flipV="1">
+            <a:off x="1619672" y="805354"/>
+            <a:ext cx="1944216" cy="1944216"/>
+          </a:xfrm>
+          <a:prstGeom prst="straightConnector1">
+            <a:avLst/>
+          </a:prstGeom>
+          <a:ln>
+            <a:headEnd type="arrow"/>
+            <a:tailEnd type="arrow"/>
+          </a:ln>
+        </p:spPr>
+        <p:style>
+          <a:lnRef idx="1">
+            <a:schemeClr val="accent1"/>
+          </a:lnRef>
+          <a:fillRef idx="0">
+            <a:schemeClr val="accent1"/>
+          </a:fillRef>
+          <a:effectRef idx="0">
+            <a:schemeClr val="accent1"/>
+          </a:effectRef>
+          <a:fontRef idx="minor">
+            <a:schemeClr val="tx1"/>
+          </a:fontRef>
+        </p:style>
+      </p:cxnSp>
+      <p:cxnSp>
+        <p:nvCxnSpPr>
+          <p:cNvPr id="30" name="Прямая со стрелкой 29"/>
+          <p:cNvCxnSpPr>
+            <a:stCxn id="4" idx="3"/>
+            <a:endCxn id="15" idx="1"/>
+          </p:cNvCxnSpPr>
+          <p:nvPr/>
+        </p:nvCxnSpPr>
+        <p:spPr>
+          <a:xfrm>
+            <a:off x="5076056" y="805354"/>
+            <a:ext cx="1584176" cy="144016"/>
+          </a:xfrm>
+          <a:prstGeom prst="straightConnector1">
+            <a:avLst/>
+          </a:prstGeom>
+          <a:ln>
+            <a:headEnd type="arrow"/>
+            <a:tailEnd type="arrow"/>
+          </a:ln>
+        </p:spPr>
+        <p:style>
+          <a:lnRef idx="1">
+            <a:schemeClr val="accent1"/>
+          </a:lnRef>
+          <a:fillRef idx="0">
+            <a:schemeClr val="accent1"/>
+          </a:fillRef>
+          <a:effectRef idx="0">
+            <a:schemeClr val="accent1"/>
+          </a:effectRef>
+          <a:fontRef idx="minor">
+            <a:schemeClr val="tx1"/>
+          </a:fontRef>
+        </p:style>
+      </p:cxnSp>
+      <p:cxnSp>
+        <p:nvCxnSpPr>
+          <p:cNvPr id="32" name="Прямая со стрелкой 31"/>
+          <p:cNvCxnSpPr>
+            <a:stCxn id="4" idx="3"/>
+            <a:endCxn id="11" idx="1"/>
+          </p:cNvCxnSpPr>
+          <p:nvPr/>
+        </p:nvCxnSpPr>
+        <p:spPr>
+          <a:xfrm>
+            <a:off x="5076056" y="805354"/>
+            <a:ext cx="1584176" cy="648072"/>
+          </a:xfrm>
+          <a:prstGeom prst="straightConnector1">
+            <a:avLst/>
+          </a:prstGeom>
+          <a:ln>
+            <a:headEnd type="arrow"/>
+            <a:tailEnd type="arrow"/>
+          </a:ln>
+        </p:spPr>
+        <p:style>
+          <a:lnRef idx="1">
+            <a:schemeClr val="accent1"/>
+          </a:lnRef>
+          <a:fillRef idx="0">
+            <a:schemeClr val="accent1"/>
+          </a:fillRef>
+          <a:effectRef idx="0">
+            <a:schemeClr val="accent1"/>
+          </a:effectRef>
+          <a:fontRef idx="minor">
+            <a:schemeClr val="tx1"/>
+          </a:fontRef>
+        </p:style>
+      </p:cxnSp>
+      <p:cxnSp>
+        <p:nvCxnSpPr>
+          <p:cNvPr id="34" name="Прямая со стрелкой 33"/>
+          <p:cNvCxnSpPr>
+            <a:stCxn id="4" idx="3"/>
+            <a:endCxn id="12" idx="1"/>
+          </p:cNvCxnSpPr>
+          <p:nvPr/>
+        </p:nvCxnSpPr>
+        <p:spPr>
+          <a:xfrm>
+            <a:off x="5076056" y="805354"/>
+            <a:ext cx="1584176" cy="1152128"/>
+          </a:xfrm>
+          <a:prstGeom prst="straightConnector1">
+            <a:avLst/>
+          </a:prstGeom>
+          <a:ln>
+            <a:headEnd type="arrow"/>
+            <a:tailEnd type="arrow"/>
+          </a:ln>
+        </p:spPr>
+        <p:style>
+          <a:lnRef idx="1">
+            <a:schemeClr val="accent1"/>
+          </a:lnRef>
+          <a:fillRef idx="0">
+            <a:schemeClr val="accent1"/>
+          </a:fillRef>
+          <a:effectRef idx="0">
+            <a:schemeClr val="accent1"/>
+          </a:effectRef>
+          <a:fontRef idx="minor">
+            <a:schemeClr val="tx1"/>
+          </a:fontRef>
+        </p:style>
+      </p:cxnSp>
+      <p:cxnSp>
+        <p:nvCxnSpPr>
+          <p:cNvPr id="37" name="Прямая со стрелкой 36"/>
+          <p:cNvCxnSpPr>
+            <a:stCxn id="4" idx="3"/>
+            <a:endCxn id="16" idx="1"/>
+          </p:cNvCxnSpPr>
+          <p:nvPr/>
+        </p:nvCxnSpPr>
+        <p:spPr>
+          <a:xfrm>
+            <a:off x="5076056" y="805354"/>
+            <a:ext cx="1584176" cy="1584176"/>
+          </a:xfrm>
+          <a:prstGeom prst="straightConnector1">
+            <a:avLst/>
+          </a:prstGeom>
+          <a:ln>
+            <a:headEnd type="arrow"/>
+            <a:tailEnd type="arrow"/>
+          </a:ln>
+        </p:spPr>
+        <p:style>
+          <a:lnRef idx="1">
+            <a:schemeClr val="accent1"/>
+          </a:lnRef>
+          <a:fillRef idx="0">
+            <a:schemeClr val="accent1"/>
+          </a:fillRef>
+          <a:effectRef idx="0">
+            <a:schemeClr val="accent1"/>
+          </a:effectRef>
+          <a:fontRef idx="minor">
+            <a:schemeClr val="tx1"/>
+          </a:fontRef>
+        </p:style>
+      </p:cxnSp>
+      <p:cxnSp>
+        <p:nvCxnSpPr>
+          <p:cNvPr id="40" name="Прямая со стрелкой 39"/>
+          <p:cNvCxnSpPr>
+            <a:stCxn id="4" idx="3"/>
+            <a:endCxn id="18" idx="1"/>
+          </p:cNvCxnSpPr>
+          <p:nvPr/>
+        </p:nvCxnSpPr>
+        <p:spPr>
+          <a:xfrm>
+            <a:off x="5076056" y="805354"/>
+            <a:ext cx="1584176" cy="2016224"/>
+          </a:xfrm>
+          <a:prstGeom prst="straightConnector1">
+            <a:avLst/>
+          </a:prstGeom>
+          <a:ln>
+            <a:headEnd type="arrow"/>
+            <a:tailEnd type="arrow"/>
+          </a:ln>
+        </p:spPr>
+        <p:style>
+          <a:lnRef idx="1">
+            <a:schemeClr val="accent1"/>
+          </a:lnRef>
+          <a:fillRef idx="0">
+            <a:schemeClr val="accent1"/>
+          </a:fillRef>
+          <a:effectRef idx="0">
+            <a:schemeClr val="accent1"/>
+          </a:effectRef>
+          <a:fontRef idx="minor">
+            <a:schemeClr val="tx1"/>
+          </a:fontRef>
+        </p:style>
+      </p:cxnSp>
+      <p:sp>
+        <p:nvSpPr>
+          <p:cNvPr id="43" name="TextBox 42"/>
+          <p:cNvSpPr txBox="1"/>
+          <p:nvPr/>
+        </p:nvSpPr>
+        <p:spPr>
+          <a:xfrm>
+            <a:off x="323528" y="3933056"/>
+            <a:ext cx="1800200" cy="646331"/>
+          </a:xfrm>
+          <a:prstGeom prst="rect">
+            <a:avLst/>
+          </a:prstGeom>
+        </p:spPr>
+        <p:style>
+          <a:lnRef idx="2">
+            <a:schemeClr val="accent6">
+              <a:shade val="50000"/>
+            </a:schemeClr>
+          </a:lnRef>
+          <a:fillRef idx="1">
+            <a:schemeClr val="accent6"/>
+          </a:fillRef>
+          <a:effectRef idx="0">
+            <a:schemeClr val="accent6"/>
+          </a:effectRef>
+          <a:fontRef idx="minor">
+            <a:schemeClr val="lt1"/>
+          </a:fontRef>
+        </p:style>
+        <p:txBody>
+          <a:bodyPr wrap="square" rtlCol="0">
+            <a:spAutoFit/>
+          </a:bodyPr>
+          <a:lstStyle/>
+          <a:p>
+            <a:r>
+              <a:rPr lang="en-US" dirty="0" err="1" smtClean="0"/>
+              <a:t>MapFragment</a:t>
+            </a:r>
+            <a:endParaRPr lang="en-US" dirty="0" smtClean="0"/>
+          </a:p>
+          <a:p>
+            <a:endParaRPr lang="ru-RU" dirty="0"/>
+          </a:p>
+        </p:txBody>
+      </p:sp>
+      <p:cxnSp>
+        <p:nvCxnSpPr>
+          <p:cNvPr id="44" name="Прямая со стрелкой 43"/>
+          <p:cNvCxnSpPr>
+            <a:stCxn id="14" idx="2"/>
+            <a:endCxn id="43" idx="0"/>
+          </p:cNvCxnSpPr>
+          <p:nvPr/>
+        </p:nvCxnSpPr>
+        <p:spPr>
+          <a:xfrm>
+            <a:off x="1187624" y="2934236"/>
+            <a:ext cx="36004" cy="998820"/>
+          </a:xfrm>
+          <a:prstGeom prst="straightConnector1">
+            <a:avLst/>
+          </a:prstGeom>
+          <a:ln>
+            <a:headEnd type="arrow"/>
+            <a:tailEnd type="arrow"/>
+          </a:ln>
+        </p:spPr>
+        <p:style>
+          <a:lnRef idx="1">
+            <a:schemeClr val="accent1"/>
+          </a:lnRef>
+          <a:fillRef idx="0">
+            <a:schemeClr val="accent1"/>
+          </a:fillRef>
+          <a:effectRef idx="0">
+            <a:schemeClr val="accent1"/>
+          </a:effectRef>
+          <a:fontRef idx="minor">
+            <a:schemeClr val="tx1"/>
+          </a:fontRef>
+        </p:style>
+      </p:cxnSp>
+      <p:sp>
+        <p:nvSpPr>
+          <p:cNvPr id="48" name="Прямоугольник 47"/>
+          <p:cNvSpPr/>
+          <p:nvPr/>
+        </p:nvSpPr>
+        <p:spPr>
+          <a:xfrm>
+            <a:off x="0" y="5085184"/>
+            <a:ext cx="2592288" cy="646331"/>
+          </a:xfrm>
+          <a:prstGeom prst="rect">
+            <a:avLst/>
+          </a:prstGeom>
+        </p:spPr>
+        <p:style>
+          <a:lnRef idx="2">
+            <a:schemeClr val="accent6">
+              <a:shade val="50000"/>
+            </a:schemeClr>
+          </a:lnRef>
+          <a:fillRef idx="1">
+            <a:schemeClr val="accent6"/>
+          </a:fillRef>
+          <a:effectRef idx="0">
+            <a:schemeClr val="accent6"/>
+          </a:effectRef>
+          <a:fontRef idx="minor">
+            <a:schemeClr val="lt1"/>
+          </a:fontRef>
+        </p:style>
+        <p:txBody>
+          <a:bodyPr wrap="square">
+            <a:spAutoFit/>
+          </a:bodyPr>
+          <a:lstStyle/>
+          <a:p>
+            <a:r>
+              <a:rPr lang="en-US" dirty="0" err="1" smtClean="0"/>
+              <a:t>SupportMapFragment</a:t>
+            </a:r>
+            <a:endParaRPr lang="en-US" dirty="0" smtClean="0"/>
+          </a:p>
+          <a:p>
+            <a:endParaRPr lang="en-US" dirty="0" smtClean="0"/>
+          </a:p>
+        </p:txBody>
+      </p:sp>
+      <p:cxnSp>
+        <p:nvCxnSpPr>
+          <p:cNvPr id="51" name="Прямая со стрелкой 50"/>
+          <p:cNvCxnSpPr>
+            <a:stCxn id="43" idx="2"/>
+            <a:endCxn id="48" idx="0"/>
+          </p:cNvCxnSpPr>
+          <p:nvPr/>
+        </p:nvCxnSpPr>
+        <p:spPr>
+          <a:xfrm>
+            <a:off x="1223628" y="4579387"/>
+            <a:ext cx="72516" cy="505797"/>
+          </a:xfrm>
+          <a:prstGeom prst="straightConnector1">
+            <a:avLst/>
+          </a:prstGeom>
+          <a:ln>
+            <a:headEnd type="arrow"/>
+            <a:tailEnd type="arrow"/>
+          </a:ln>
+        </p:spPr>
+        <p:style>
+          <a:lnRef idx="1">
+            <a:schemeClr val="accent1"/>
+          </a:lnRef>
+          <a:fillRef idx="0">
+            <a:schemeClr val="accent1"/>
+          </a:fillRef>
+          <a:effectRef idx="0">
+            <a:schemeClr val="accent1"/>
+          </a:effectRef>
+          <a:fontRef idx="minor">
+            <a:schemeClr val="tx1"/>
+          </a:fontRef>
+        </p:style>
+      </p:cxnSp>
+      <p:sp>
+        <p:nvSpPr>
+          <p:cNvPr id="65" name="Прямоугольник 64"/>
+          <p:cNvSpPr/>
+          <p:nvPr/>
+        </p:nvSpPr>
+        <p:spPr>
+          <a:xfrm>
+            <a:off x="3563888" y="2132856"/>
+            <a:ext cx="1440160" cy="646331"/>
           </a:xfrm>
           <a:prstGeom prst="rect">
             <a:avLst/>
@@ -3091,261 +4124,368 @@
           </a:fontRef>
         </p:style>
         <p:txBody>
-          <a:bodyPr wrap="square" rtlCol="0">
+          <a:bodyPr wrap="square">
             <a:spAutoFit/>
           </a:bodyPr>
           <a:lstStyle/>
           <a:p>
             <a:r>
-              <a:rPr lang="ru-RU" sz="1400" dirty="0" smtClean="0"/>
-              <a:t>Змеев Максим:</a:t>
-            </a:r>
-          </a:p>
-          <a:p>
-            <a:pPr>
-              <a:buFont typeface="Arial" pitchFamily="34" charset="0"/>
-              <a:buChar char="•"/>
-            </a:pPr>
-            <a:r>
-              <a:rPr lang="ru-RU" sz="1400" dirty="0" smtClean="0"/>
-              <a:t>Клиент-сервер:</a:t>
-            </a:r>
-          </a:p>
-          <a:p>
-            <a:r>
-              <a:rPr lang="ru-RU" sz="1400" dirty="0" smtClean="0"/>
-              <a:t>Библиотеки:</a:t>
-            </a:r>
-          </a:p>
-          <a:p>
-            <a:r>
-              <a:rPr lang="en-US" sz="1400" dirty="0" err="1" smtClean="0"/>
-              <a:t>java.net.Socket</a:t>
-            </a:r>
-            <a:r>
-              <a:rPr lang="en-US" sz="1400" dirty="0" smtClean="0"/>
-              <a:t>, </a:t>
-            </a:r>
-            <a:r>
-              <a:rPr lang="en-US" sz="1400" dirty="0" err="1" smtClean="0"/>
-              <a:t>java.net.ServerSocket</a:t>
-            </a:r>
-            <a:endParaRPr lang="ru-RU" sz="1400" dirty="0" smtClean="0"/>
-          </a:p>
-          <a:p>
-            <a:pPr>
-              <a:buFont typeface="Arial" pitchFamily="34" charset="0"/>
-              <a:buChar char="•"/>
-            </a:pPr>
-            <a:r>
-              <a:rPr lang="ru-RU" sz="1400" dirty="0" smtClean="0"/>
-              <a:t>Классы:</a:t>
-            </a:r>
-          </a:p>
-          <a:p>
-            <a:r>
-              <a:rPr lang="en-US" sz="1400" dirty="0" err="1" smtClean="0"/>
-              <a:t>BufferedReader</a:t>
-            </a:r>
-            <a:r>
-              <a:rPr lang="en-US" sz="1400" dirty="0" smtClean="0"/>
-              <a:t>, </a:t>
-            </a:r>
-            <a:r>
-              <a:rPr lang="en-US" sz="1400" dirty="0" err="1" smtClean="0"/>
-              <a:t>PrintWriter</a:t>
-            </a:r>
-            <a:r>
-              <a:rPr lang="en-US" sz="1400" dirty="0" smtClean="0"/>
-              <a:t>, </a:t>
-            </a:r>
-            <a:r>
-              <a:rPr lang="en-US" sz="1400" dirty="0" err="1" smtClean="0"/>
-              <a:t>ByteArrayOutputStream</a:t>
-            </a:r>
-            <a:endParaRPr lang="ru-RU" sz="1400" dirty="0" smtClean="0"/>
-          </a:p>
-          <a:p>
-            <a:r>
-              <a:rPr lang="en-US" sz="1400" dirty="0" err="1" smtClean="0"/>
-              <a:t>getOutputStream</a:t>
-            </a:r>
-            <a:r>
-              <a:rPr lang="en-US" sz="1400" dirty="0" smtClean="0"/>
-              <a:t>()</a:t>
-            </a:r>
-            <a:endParaRPr lang="ru-RU" sz="1400" dirty="0" smtClean="0"/>
-          </a:p>
-          <a:p>
-            <a:r>
-              <a:rPr lang="en-US" sz="1400" dirty="0" smtClean="0"/>
+              <a:rPr lang="en-US" dirty="0" smtClean="0"/>
               <a:t>Socket</a:t>
             </a:r>
-            <a:endParaRPr lang="ru-RU" sz="1400" dirty="0" smtClean="0"/>
-          </a:p>
-          <a:p>
-            <a:pPr>
-              <a:buFont typeface="Arial" pitchFamily="34" charset="0"/>
-              <a:buChar char="•"/>
-            </a:pPr>
-            <a:r>
-              <a:rPr lang="ru-RU" sz="1400" dirty="0" smtClean="0"/>
-              <a:t>Методы:</a:t>
-            </a:r>
-          </a:p>
-          <a:p>
-            <a:r>
-              <a:rPr lang="en-US" sz="1400" dirty="0" err="1" smtClean="0"/>
-              <a:t>getInputStream</a:t>
-            </a:r>
-            <a:r>
-              <a:rPr lang="en-US" sz="1400" dirty="0" smtClean="0"/>
-              <a:t>, read(), write</a:t>
-            </a:r>
-            <a:r>
-              <a:rPr lang="ru-RU" sz="1400" dirty="0" smtClean="0"/>
-              <a:t>, </a:t>
-            </a:r>
-            <a:r>
-              <a:rPr lang="en-US" sz="1400" dirty="0" smtClean="0"/>
-              <a:t>accept()</a:t>
-            </a:r>
-            <a:r>
-              <a:rPr lang="ru-RU" sz="1400" dirty="0" smtClean="0"/>
-              <a:t>, </a:t>
-            </a:r>
-            <a:r>
-              <a:rPr lang="en-US" sz="1400" dirty="0" smtClean="0"/>
-              <a:t>close()</a:t>
-            </a:r>
-            <a:endParaRPr lang="ru-RU" sz="1400" dirty="0" smtClean="0"/>
-          </a:p>
-          <a:p>
-            <a:r>
-              <a:rPr lang="ru-RU" sz="1400" dirty="0" smtClean="0"/>
-              <a:t>БД:</a:t>
-            </a:r>
-            <a:endParaRPr lang="en-US" sz="1400" dirty="0" smtClean="0"/>
-          </a:p>
-          <a:p>
-            <a:pPr>
-              <a:buFont typeface="Arial" pitchFamily="34" charset="0"/>
-              <a:buChar char="•"/>
-            </a:pPr>
-            <a:r>
-              <a:rPr lang="ru-RU" sz="1400" dirty="0" smtClean="0"/>
-              <a:t>Классы</a:t>
-            </a:r>
-            <a:endParaRPr lang="ru-RU" sz="1400" dirty="0" smtClean="0"/>
-          </a:p>
-          <a:p>
-            <a:r>
-              <a:rPr lang="en-US" sz="1400" dirty="0" err="1" smtClean="0"/>
-              <a:t>DBHelper</a:t>
-            </a:r>
-            <a:endParaRPr lang="ru-RU" sz="1400" dirty="0" smtClean="0"/>
-          </a:p>
-          <a:p>
-            <a:r>
-              <a:rPr lang="en-US" sz="1400" dirty="0" err="1" smtClean="0"/>
-              <a:t>SQLiteDatabase</a:t>
-            </a:r>
-            <a:endParaRPr lang="en-US" sz="1400" dirty="0" smtClean="0"/>
-          </a:p>
-          <a:p>
-            <a:r>
-              <a:rPr lang="en-US" sz="1400" dirty="0" smtClean="0"/>
-              <a:t>Cursor</a:t>
-            </a:r>
-          </a:p>
-          <a:p>
-            <a:r>
-              <a:rPr lang="en-US" sz="1400" dirty="0" err="1" smtClean="0"/>
-              <a:t>ContentValues</a:t>
-            </a:r>
-            <a:endParaRPr lang="ru-RU" sz="1400" dirty="0" smtClean="0"/>
-          </a:p>
-          <a:p>
-            <a:pPr>
-              <a:buFont typeface="Arial" pitchFamily="34" charset="0"/>
-              <a:buChar char="•"/>
-            </a:pPr>
-            <a:r>
-              <a:rPr lang="ru-RU" sz="1400" dirty="0" smtClean="0"/>
-              <a:t>Методы:</a:t>
-            </a:r>
-          </a:p>
-          <a:p>
-            <a:r>
-              <a:rPr lang="en-US" sz="1400" dirty="0" err="1" smtClean="0"/>
-              <a:t>getWritableDatabase</a:t>
-            </a:r>
-            <a:r>
-              <a:rPr lang="en-US" sz="1400" dirty="0" smtClean="0"/>
-              <a:t>, close</a:t>
-            </a:r>
-            <a:r>
-              <a:rPr lang="ru-RU" sz="1400" dirty="0" smtClean="0"/>
-              <a:t>,</a:t>
-            </a:r>
-          </a:p>
-          <a:p>
-            <a:r>
-              <a:rPr lang="en-US" sz="1400" dirty="0"/>
-              <a:t> </a:t>
-            </a:r>
-            <a:r>
-              <a:rPr lang="en-US" sz="1400" dirty="0" smtClean="0"/>
-              <a:t>query() ,</a:t>
-            </a:r>
-            <a:r>
-              <a:rPr lang="ru-RU" sz="1400" dirty="0" smtClean="0"/>
-              <a:t> </a:t>
-            </a:r>
-            <a:r>
-              <a:rPr lang="en-US" sz="1400" dirty="0" err="1" smtClean="0"/>
-              <a:t>moveToFirst</a:t>
-            </a:r>
-            <a:r>
-              <a:rPr lang="en-US" sz="1400" dirty="0" smtClean="0"/>
-              <a:t>, </a:t>
-            </a:r>
-            <a:r>
-              <a:rPr lang="en-US" sz="1400" dirty="0" err="1" smtClean="0"/>
-              <a:t>moveToNext</a:t>
-            </a:r>
-            <a:r>
-              <a:rPr lang="en-US" sz="1400" dirty="0" smtClean="0"/>
-              <a:t>, </a:t>
-            </a:r>
-            <a:r>
-              <a:rPr lang="en-US" sz="1400" dirty="0" err="1" smtClean="0"/>
-              <a:t>getColumnIndex</a:t>
-            </a:r>
-            <a:endParaRPr lang="ru-RU" sz="1400" dirty="0" smtClean="0"/>
-          </a:p>
-          <a:p>
-            <a:endParaRPr lang="ru-RU" dirty="0"/>
-          </a:p>
-        </p:txBody>
-      </p:sp>
-      <p:sp>
-        <p:nvSpPr>
-          <p:cNvPr id="3" name="TextBox 2"/>
-          <p:cNvSpPr txBox="1"/>
+          </a:p>
+          <a:p>
+            <a:endParaRPr lang="ru-RU" dirty="0" smtClean="0"/>
+          </a:p>
+        </p:txBody>
+      </p:sp>
+      <p:cxnSp>
+        <p:nvCxnSpPr>
+          <p:cNvPr id="67" name="Прямая со стрелкой 66"/>
+          <p:cNvCxnSpPr>
+            <a:stCxn id="65" idx="3"/>
+            <a:endCxn id="12" idx="1"/>
+          </p:cNvCxnSpPr>
           <p:nvPr/>
-        </p:nvSpPr>
+        </p:nvCxnSpPr>
+        <p:spPr>
+          <a:xfrm flipV="1">
+            <a:off x="5004048" y="1957482"/>
+            <a:ext cx="1656184" cy="498540"/>
+          </a:xfrm>
+          <a:prstGeom prst="straightConnector1">
+            <a:avLst/>
+          </a:prstGeom>
+          <a:ln>
+            <a:headEnd type="arrow"/>
+            <a:tailEnd type="arrow"/>
+          </a:ln>
+        </p:spPr>
+        <p:style>
+          <a:lnRef idx="1">
+            <a:schemeClr val="accent1"/>
+          </a:lnRef>
+          <a:fillRef idx="0">
+            <a:schemeClr val="accent1"/>
+          </a:fillRef>
+          <a:effectRef idx="0">
+            <a:schemeClr val="accent1"/>
+          </a:effectRef>
+          <a:fontRef idx="minor">
+            <a:schemeClr val="tx1"/>
+          </a:fontRef>
+        </p:style>
+      </p:cxnSp>
+      <p:cxnSp>
+        <p:nvCxnSpPr>
+          <p:cNvPr id="68" name="Прямая со стрелкой 67"/>
+          <p:cNvCxnSpPr>
+            <a:stCxn id="65" idx="3"/>
+            <a:endCxn id="11" idx="1"/>
+          </p:cNvCxnSpPr>
+          <p:nvPr/>
+        </p:nvCxnSpPr>
+        <p:spPr>
+          <a:xfrm flipV="1">
+            <a:off x="5004048" y="1453426"/>
+            <a:ext cx="1656184" cy="1002596"/>
+          </a:xfrm>
+          <a:prstGeom prst="straightConnector1">
+            <a:avLst/>
+          </a:prstGeom>
+          <a:ln>
+            <a:headEnd type="arrow"/>
+            <a:tailEnd type="arrow"/>
+          </a:ln>
+        </p:spPr>
+        <p:style>
+          <a:lnRef idx="1">
+            <a:schemeClr val="accent1"/>
+          </a:lnRef>
+          <a:fillRef idx="0">
+            <a:schemeClr val="accent1"/>
+          </a:fillRef>
+          <a:effectRef idx="0">
+            <a:schemeClr val="accent1"/>
+          </a:effectRef>
+          <a:fontRef idx="minor">
+            <a:schemeClr val="tx1"/>
+          </a:fontRef>
+        </p:style>
+      </p:cxnSp>
+      <p:cxnSp>
+        <p:nvCxnSpPr>
+          <p:cNvPr id="71" name="Прямая со стрелкой 70"/>
+          <p:cNvCxnSpPr>
+            <a:stCxn id="65" idx="3"/>
+            <a:endCxn id="15" idx="1"/>
+          </p:cNvCxnSpPr>
+          <p:nvPr/>
+        </p:nvCxnSpPr>
+        <p:spPr>
+          <a:xfrm flipV="1">
+            <a:off x="5004048" y="949370"/>
+            <a:ext cx="1656184" cy="1506652"/>
+          </a:xfrm>
+          <a:prstGeom prst="straightConnector1">
+            <a:avLst/>
+          </a:prstGeom>
+          <a:ln>
+            <a:headEnd type="arrow"/>
+            <a:tailEnd type="arrow"/>
+          </a:ln>
+        </p:spPr>
+        <p:style>
+          <a:lnRef idx="1">
+            <a:schemeClr val="accent1"/>
+          </a:lnRef>
+          <a:fillRef idx="0">
+            <a:schemeClr val="accent1"/>
+          </a:fillRef>
+          <a:effectRef idx="0">
+            <a:schemeClr val="accent1"/>
+          </a:effectRef>
+          <a:fontRef idx="minor">
+            <a:schemeClr val="tx1"/>
+          </a:fontRef>
+        </p:style>
+      </p:cxnSp>
+      <p:cxnSp>
+        <p:nvCxnSpPr>
+          <p:cNvPr id="74" name="Прямая со стрелкой 73"/>
+          <p:cNvCxnSpPr>
+            <a:stCxn id="65" idx="3"/>
+            <a:endCxn id="18" idx="1"/>
+          </p:cNvCxnSpPr>
+          <p:nvPr/>
+        </p:nvCxnSpPr>
         <p:spPr>
           <a:xfrm>
-            <a:off x="5220072" y="2610683"/>
-            <a:ext cx="3923928" cy="4247317"/>
+            <a:off x="5004048" y="2456022"/>
+            <a:ext cx="1656184" cy="365556"/>
+          </a:xfrm>
+          <a:prstGeom prst="straightConnector1">
+            <a:avLst/>
+          </a:prstGeom>
+          <a:ln>
+            <a:headEnd type="arrow"/>
+            <a:tailEnd type="arrow"/>
+          </a:ln>
+        </p:spPr>
+        <p:style>
+          <a:lnRef idx="1">
+            <a:schemeClr val="accent1"/>
+          </a:lnRef>
+          <a:fillRef idx="0">
+            <a:schemeClr val="accent1"/>
+          </a:fillRef>
+          <a:effectRef idx="0">
+            <a:schemeClr val="accent1"/>
+          </a:effectRef>
+          <a:fontRef idx="minor">
+            <a:schemeClr val="tx1"/>
+          </a:fontRef>
+        </p:style>
+      </p:cxnSp>
+      <p:cxnSp>
+        <p:nvCxnSpPr>
+          <p:cNvPr id="77" name="Прямая со стрелкой 76"/>
+          <p:cNvCxnSpPr>
+            <a:stCxn id="65" idx="1"/>
+            <a:endCxn id="14" idx="3"/>
+          </p:cNvCxnSpPr>
+          <p:nvPr/>
+        </p:nvCxnSpPr>
+        <p:spPr>
+          <a:xfrm flipH="1">
+            <a:off x="1619672" y="2456022"/>
+            <a:ext cx="1944216" cy="293548"/>
+          </a:xfrm>
+          <a:prstGeom prst="straightConnector1">
+            <a:avLst/>
+          </a:prstGeom>
+          <a:ln>
+            <a:headEnd type="arrow"/>
+            <a:tailEnd type="arrow"/>
+          </a:ln>
+        </p:spPr>
+        <p:style>
+          <a:lnRef idx="1">
+            <a:schemeClr val="accent1"/>
+          </a:lnRef>
+          <a:fillRef idx="0">
+            <a:schemeClr val="accent1"/>
+          </a:fillRef>
+          <a:effectRef idx="0">
+            <a:schemeClr val="accent1"/>
+          </a:effectRef>
+          <a:fontRef idx="minor">
+            <a:schemeClr val="tx1"/>
+          </a:fontRef>
+        </p:style>
+      </p:cxnSp>
+      <p:cxnSp>
+        <p:nvCxnSpPr>
+          <p:cNvPr id="80" name="Прямая со стрелкой 79"/>
+          <p:cNvCxnSpPr>
+            <a:stCxn id="65" idx="1"/>
+            <a:endCxn id="10" idx="3"/>
+          </p:cNvCxnSpPr>
+          <p:nvPr/>
+        </p:nvCxnSpPr>
+        <p:spPr>
+          <a:xfrm flipH="1" flipV="1">
+            <a:off x="1619672" y="2317522"/>
+            <a:ext cx="1944216" cy="138500"/>
+          </a:xfrm>
+          <a:prstGeom prst="straightConnector1">
+            <a:avLst/>
+          </a:prstGeom>
+          <a:ln>
+            <a:headEnd type="arrow"/>
+            <a:tailEnd type="arrow"/>
+          </a:ln>
+        </p:spPr>
+        <p:style>
+          <a:lnRef idx="1">
+            <a:schemeClr val="accent1"/>
+          </a:lnRef>
+          <a:fillRef idx="0">
+            <a:schemeClr val="accent1"/>
+          </a:fillRef>
+          <a:effectRef idx="0">
+            <a:schemeClr val="accent1"/>
+          </a:effectRef>
+          <a:fontRef idx="minor">
+            <a:schemeClr val="tx1"/>
+          </a:fontRef>
+        </p:style>
+      </p:cxnSp>
+      <p:cxnSp>
+        <p:nvCxnSpPr>
+          <p:cNvPr id="83" name="Прямая со стрелкой 82"/>
+          <p:cNvCxnSpPr>
+            <a:stCxn id="65" idx="1"/>
+            <a:endCxn id="9" idx="3"/>
+          </p:cNvCxnSpPr>
+          <p:nvPr/>
+        </p:nvCxnSpPr>
+        <p:spPr>
+          <a:xfrm flipH="1" flipV="1">
+            <a:off x="1619672" y="1885474"/>
+            <a:ext cx="1944216" cy="570548"/>
+          </a:xfrm>
+          <a:prstGeom prst="straightConnector1">
+            <a:avLst/>
+          </a:prstGeom>
+          <a:ln>
+            <a:headEnd type="arrow"/>
+            <a:tailEnd type="arrow"/>
+          </a:ln>
+        </p:spPr>
+        <p:style>
+          <a:lnRef idx="1">
+            <a:schemeClr val="accent1"/>
+          </a:lnRef>
+          <a:fillRef idx="0">
+            <a:schemeClr val="accent1"/>
+          </a:fillRef>
+          <a:effectRef idx="0">
+            <a:schemeClr val="accent1"/>
+          </a:effectRef>
+          <a:fontRef idx="minor">
+            <a:schemeClr val="tx1"/>
+          </a:fontRef>
+        </p:style>
+      </p:cxnSp>
+      <p:cxnSp>
+        <p:nvCxnSpPr>
+          <p:cNvPr id="86" name="Прямая со стрелкой 85"/>
+          <p:cNvCxnSpPr>
+            <a:stCxn id="65" idx="1"/>
+            <a:endCxn id="13" idx="3"/>
+          </p:cNvCxnSpPr>
+          <p:nvPr/>
+        </p:nvCxnSpPr>
+        <p:spPr>
+          <a:xfrm flipH="1" flipV="1">
+            <a:off x="1619672" y="1453426"/>
+            <a:ext cx="1944216" cy="1002596"/>
+          </a:xfrm>
+          <a:prstGeom prst="straightConnector1">
+            <a:avLst/>
+          </a:prstGeom>
+          <a:ln>
+            <a:headEnd type="arrow"/>
+            <a:tailEnd type="arrow"/>
+          </a:ln>
+        </p:spPr>
+        <p:style>
+          <a:lnRef idx="1">
+            <a:schemeClr val="accent1"/>
+          </a:lnRef>
+          <a:fillRef idx="0">
+            <a:schemeClr val="accent1"/>
+          </a:fillRef>
+          <a:effectRef idx="0">
+            <a:schemeClr val="accent1"/>
+          </a:effectRef>
+          <a:fontRef idx="minor">
+            <a:schemeClr val="tx1"/>
+          </a:fontRef>
+        </p:style>
+      </p:cxnSp>
+      <p:cxnSp>
+        <p:nvCxnSpPr>
+          <p:cNvPr id="89" name="Прямая со стрелкой 88"/>
+          <p:cNvCxnSpPr>
+            <a:stCxn id="65" idx="1"/>
+            <a:endCxn id="8" idx="3"/>
+          </p:cNvCxnSpPr>
+          <p:nvPr/>
+        </p:nvCxnSpPr>
+        <p:spPr>
+          <a:xfrm flipH="1" flipV="1">
+            <a:off x="1619672" y="949370"/>
+            <a:ext cx="1944216" cy="1506652"/>
+          </a:xfrm>
+          <a:prstGeom prst="straightConnector1">
+            <a:avLst/>
+          </a:prstGeom>
+          <a:ln>
+            <a:headEnd type="arrow"/>
+            <a:tailEnd type="arrow"/>
+          </a:ln>
+        </p:spPr>
+        <p:style>
+          <a:lnRef idx="1">
+            <a:schemeClr val="accent1"/>
+          </a:lnRef>
+          <a:fillRef idx="0">
+            <a:schemeClr val="accent1"/>
+          </a:fillRef>
+          <a:effectRef idx="0">
+            <a:schemeClr val="accent1"/>
+          </a:effectRef>
+          <a:fontRef idx="minor">
+            <a:schemeClr val="tx1"/>
+          </a:fontRef>
+        </p:style>
+      </p:cxnSp>
+      <p:sp>
+        <p:nvSpPr>
+          <p:cNvPr id="93" name="Прямоугольник 92"/>
+          <p:cNvSpPr/>
+          <p:nvPr/>
+        </p:nvSpPr>
+        <p:spPr>
+          <a:xfrm>
+            <a:off x="4788024" y="3933056"/>
+            <a:ext cx="1658787" cy="369332"/>
           </a:xfrm>
           <a:prstGeom prst="rect">
             <a:avLst/>
           </a:prstGeom>
-          <a:solidFill>
-            <a:srgbClr val="00B050"/>
-          </a:solidFill>
         </p:spPr>
         <p:style>
           <a:lnRef idx="2">
@@ -3364,145 +4504,14 @@
           </a:fontRef>
         </p:style>
         <p:txBody>
-          <a:bodyPr wrap="square" rtlCol="0">
+          <a:bodyPr wrap="none">
             <a:spAutoFit/>
           </a:bodyPr>
           <a:lstStyle/>
           <a:p>
             <a:r>
-              <a:rPr lang="ru-RU" dirty="0" smtClean="0"/>
-              <a:t>Стрельцов Фёдор:</a:t>
-            </a:r>
-          </a:p>
-          <a:p>
-            <a:pPr>
-              <a:buFont typeface="Arial" pitchFamily="34" charset="0"/>
-              <a:buChar char="•"/>
-            </a:pPr>
-            <a:r>
-              <a:rPr lang="ru-RU" dirty="0" smtClean="0"/>
-              <a:t>Библиотеки </a:t>
-            </a:r>
-            <a:r>
               <a:rPr lang="en-US" dirty="0" err="1" smtClean="0"/>
-              <a:t>com.google.android.gms.maps.GoogleMap</a:t>
-            </a:r>
-            <a:r>
-              <a:rPr lang="en-US" dirty="0" smtClean="0"/>
-              <a:t>, </a:t>
-            </a:r>
-            <a:r>
-              <a:rPr lang="en-US" dirty="0" err="1" smtClean="0"/>
-              <a:t>com.google.android.gms.maps.SupportMapFragment</a:t>
-            </a:r>
-            <a:r>
-              <a:rPr lang="en-US" dirty="0" smtClean="0"/>
-              <a:t>, </a:t>
-            </a:r>
-            <a:r>
-              <a:rPr lang="en-US" dirty="0" err="1" smtClean="0"/>
-              <a:t>android.view.View</a:t>
-            </a:r>
-            <a:r>
-              <a:rPr lang="en-US" dirty="0" smtClean="0"/>
-              <a:t>, android.support.v4.app.FragmentActivity, </a:t>
-            </a:r>
-            <a:r>
-              <a:rPr lang="en-US" dirty="0" err="1" smtClean="0"/>
-              <a:t>android.os.Bundle</a:t>
-            </a:r>
-            <a:endParaRPr lang="ru-RU" dirty="0" smtClean="0"/>
-          </a:p>
-          <a:p>
-            <a:pPr>
-              <a:buFont typeface="Arial" pitchFamily="34" charset="0"/>
-              <a:buChar char="•"/>
-            </a:pPr>
-            <a:r>
-              <a:rPr lang="ru-RU" dirty="0" smtClean="0"/>
-              <a:t>Классы</a:t>
-            </a:r>
-          </a:p>
-          <a:p>
-            <a:r>
-              <a:rPr lang="en-US" dirty="0" err="1" smtClean="0"/>
-              <a:t>SupportMapFragment</a:t>
-            </a:r>
-            <a:endParaRPr lang="en-US" dirty="0" smtClean="0"/>
-          </a:p>
-          <a:p>
-            <a:pPr>
-              <a:buFont typeface="Arial" pitchFamily="34" charset="0"/>
-              <a:buChar char="•"/>
-            </a:pPr>
-            <a:r>
-              <a:rPr lang="en-US" dirty="0" err="1" smtClean="0"/>
-              <a:t>MapFragment</a:t>
-            </a:r>
-            <a:r>
-              <a:rPr lang="en-US" dirty="0" smtClean="0"/>
-              <a:t/>
-            </a:r>
-            <a:br>
-              <a:rPr lang="en-US" dirty="0" smtClean="0"/>
-            </a:br>
-            <a:r>
-              <a:rPr lang="ru-RU" dirty="0" smtClean="0"/>
-              <a:t>Методы </a:t>
-            </a:r>
-            <a:r>
-              <a:rPr lang="en-US" dirty="0" smtClean="0"/>
-              <a:t>Init, </a:t>
-            </a:r>
-            <a:r>
-              <a:rPr lang="en-US" dirty="0" err="1" smtClean="0"/>
-              <a:t>onCreate</a:t>
-            </a:r>
-            <a:r>
-              <a:rPr lang="en-US" dirty="0" smtClean="0"/>
-              <a:t>, </a:t>
-            </a:r>
-            <a:r>
-              <a:rPr lang="en-US" dirty="0" err="1" smtClean="0"/>
-              <a:t>onClickTest</a:t>
-            </a:r>
-            <a:r>
-              <a:rPr lang="en-US" dirty="0" smtClean="0"/>
-              <a:t>, </a:t>
-            </a:r>
-            <a:r>
-              <a:rPr lang="en-US" dirty="0" err="1" smtClean="0"/>
-              <a:t>onMapClick</a:t>
-            </a:r>
-            <a:r>
-              <a:rPr lang="en-US" dirty="0" smtClean="0"/>
-              <a:t>, </a:t>
-            </a:r>
-            <a:r>
-              <a:rPr lang="en-US" dirty="0" err="1" smtClean="0"/>
-              <a:t>onMapLongClick</a:t>
-            </a:r>
-            <a:r>
-              <a:rPr lang="en-US" dirty="0" smtClean="0"/>
-              <a:t>, </a:t>
-            </a:r>
-            <a:r>
-              <a:rPr lang="en-US" dirty="0" err="1" smtClean="0"/>
-              <a:t>onCameraChange</a:t>
-            </a:r>
-            <a:r>
-              <a:rPr lang="en-US" dirty="0" smtClean="0"/>
-              <a:t>,</a:t>
-            </a:r>
-            <a:r>
-              <a:rPr lang="en-US" dirty="0" smtClean="0">
-                <a:hlinkClick r:id="rId2"/>
-              </a:rPr>
-              <a:t> </a:t>
-            </a:r>
-            <a:r>
-              <a:rPr lang="en-US" dirty="0" err="1" smtClean="0"/>
-              <a:t>SetMyLocationButtonEnabled</a:t>
+              <a:t>BufferedReader</a:t>
             </a:r>
             <a:endParaRPr lang="ru-RU" dirty="0"/>
           </a:p>
@@ -3510,23 +4519,18 @@
       </p:sp>
       <p:sp>
         <p:nvSpPr>
-          <p:cNvPr id="6" name="TextBox 5"/>
-          <p:cNvSpPr txBox="1"/>
+          <p:cNvPr id="94" name="Прямоугольник 93"/>
+          <p:cNvSpPr/>
           <p:nvPr/>
         </p:nvSpPr>
         <p:spPr>
           <a:xfrm>
-            <a:off x="5580112" y="0"/>
-            <a:ext cx="3563888" cy="2031325"/>
+            <a:off x="3275856" y="3933056"/>
+            <a:ext cx="1234505" cy="369332"/>
           </a:xfrm>
           <a:prstGeom prst="rect">
             <a:avLst/>
           </a:prstGeom>
-          <a:solidFill>
-            <a:schemeClr val="accent3">
-              <a:lumMod val="50000"/>
-            </a:schemeClr>
-          </a:solidFill>
         </p:spPr>
         <p:style>
           <a:lnRef idx="2">
@@ -3545,6 +4549,304 @@
           </a:fontRef>
         </p:style>
         <p:txBody>
+          <a:bodyPr wrap="none">
+            <a:spAutoFit/>
+          </a:bodyPr>
+          <a:lstStyle/>
+          <a:p>
+            <a:r>
+              <a:rPr lang="en-US" dirty="0" err="1" smtClean="0"/>
+              <a:t>PrintWriter</a:t>
+            </a:r>
+            <a:endParaRPr lang="ru-RU" dirty="0"/>
+          </a:p>
+        </p:txBody>
+      </p:sp>
+      <p:cxnSp>
+        <p:nvCxnSpPr>
+          <p:cNvPr id="96" name="Прямая со стрелкой 95"/>
+          <p:cNvCxnSpPr>
+            <a:stCxn id="65" idx="2"/>
+            <a:endCxn id="93" idx="0"/>
+          </p:cNvCxnSpPr>
+          <p:nvPr/>
+        </p:nvCxnSpPr>
+        <p:spPr>
+          <a:xfrm>
+            <a:off x="4283968" y="2779187"/>
+            <a:ext cx="1333450" cy="1153869"/>
+          </a:xfrm>
+          <a:prstGeom prst="straightConnector1">
+            <a:avLst/>
+          </a:prstGeom>
+          <a:ln>
+            <a:headEnd type="arrow"/>
+            <a:tailEnd type="arrow"/>
+          </a:ln>
+        </p:spPr>
+        <p:style>
+          <a:lnRef idx="1">
+            <a:schemeClr val="accent1"/>
+          </a:lnRef>
+          <a:fillRef idx="0">
+            <a:schemeClr val="accent1"/>
+          </a:fillRef>
+          <a:effectRef idx="0">
+            <a:schemeClr val="accent1"/>
+          </a:effectRef>
+          <a:fontRef idx="minor">
+            <a:schemeClr val="tx1"/>
+          </a:fontRef>
+        </p:style>
+      </p:cxnSp>
+      <p:cxnSp>
+        <p:nvCxnSpPr>
+          <p:cNvPr id="98" name="Прямая со стрелкой 97"/>
+          <p:cNvCxnSpPr>
+            <a:stCxn id="65" idx="2"/>
+            <a:endCxn id="94" idx="0"/>
+          </p:cNvCxnSpPr>
+          <p:nvPr/>
+        </p:nvCxnSpPr>
+        <p:spPr>
+          <a:xfrm flipH="1">
+            <a:off x="3893109" y="2779187"/>
+            <a:ext cx="390859" cy="1153869"/>
+          </a:xfrm>
+          <a:prstGeom prst="straightConnector1">
+            <a:avLst/>
+          </a:prstGeom>
+          <a:ln>
+            <a:headEnd type="arrow"/>
+            <a:tailEnd type="arrow"/>
+          </a:ln>
+        </p:spPr>
+        <p:style>
+          <a:lnRef idx="1">
+            <a:schemeClr val="accent1"/>
+          </a:lnRef>
+          <a:fillRef idx="0">
+            <a:schemeClr val="accent1"/>
+          </a:fillRef>
+          <a:effectRef idx="0">
+            <a:schemeClr val="accent1"/>
+          </a:effectRef>
+          <a:fontRef idx="minor">
+            <a:schemeClr val="tx1"/>
+          </a:fontRef>
+        </p:style>
+      </p:cxnSp>
+      <p:sp>
+        <p:nvSpPr>
+          <p:cNvPr id="99" name="Прямоугольник 98"/>
+          <p:cNvSpPr/>
+          <p:nvPr/>
+        </p:nvSpPr>
+        <p:spPr>
+          <a:xfrm>
+            <a:off x="4211960" y="5157192"/>
+            <a:ext cx="1082348" cy="369332"/>
+          </a:xfrm>
+          <a:prstGeom prst="rect">
+            <a:avLst/>
+          </a:prstGeom>
+        </p:spPr>
+        <p:style>
+          <a:lnRef idx="2">
+            <a:schemeClr val="accent3">
+              <a:shade val="50000"/>
+            </a:schemeClr>
+          </a:lnRef>
+          <a:fillRef idx="1">
+            <a:schemeClr val="accent3"/>
+          </a:fillRef>
+          <a:effectRef idx="0">
+            <a:schemeClr val="accent3"/>
+          </a:effectRef>
+          <a:fontRef idx="minor">
+            <a:schemeClr val="lt1"/>
+          </a:fontRef>
+        </p:style>
+        <p:txBody>
+          <a:bodyPr wrap="none">
+            <a:spAutoFit/>
+          </a:bodyPr>
+          <a:lstStyle/>
+          <a:p>
+            <a:r>
+              <a:rPr lang="en-US" dirty="0" err="1" smtClean="0"/>
+              <a:t>DBHelper</a:t>
+            </a:r>
+            <a:endParaRPr lang="ru-RU" dirty="0" smtClean="0"/>
+          </a:p>
+        </p:txBody>
+      </p:sp>
+      <p:cxnSp>
+        <p:nvCxnSpPr>
+          <p:cNvPr id="120" name="Прямая со стрелкой 119"/>
+          <p:cNvCxnSpPr>
+            <a:stCxn id="94" idx="2"/>
+            <a:endCxn id="99" idx="0"/>
+          </p:cNvCxnSpPr>
+          <p:nvPr/>
+        </p:nvCxnSpPr>
+        <p:spPr>
+          <a:xfrm>
+            <a:off x="3893109" y="4302388"/>
+            <a:ext cx="860025" cy="854804"/>
+          </a:xfrm>
+          <a:prstGeom prst="straightConnector1">
+            <a:avLst/>
+          </a:prstGeom>
+          <a:ln>
+            <a:headEnd type="arrow"/>
+            <a:tailEnd type="arrow"/>
+          </a:ln>
+        </p:spPr>
+        <p:style>
+          <a:lnRef idx="1">
+            <a:schemeClr val="accent1"/>
+          </a:lnRef>
+          <a:fillRef idx="0">
+            <a:schemeClr val="accent1"/>
+          </a:fillRef>
+          <a:effectRef idx="0">
+            <a:schemeClr val="accent1"/>
+          </a:effectRef>
+          <a:fontRef idx="minor">
+            <a:schemeClr val="tx1"/>
+          </a:fontRef>
+        </p:style>
+      </p:cxnSp>
+      <p:cxnSp>
+        <p:nvCxnSpPr>
+          <p:cNvPr id="122" name="Прямая со стрелкой 121"/>
+          <p:cNvCxnSpPr>
+            <a:stCxn id="93" idx="2"/>
+            <a:endCxn id="99" idx="0"/>
+          </p:cNvCxnSpPr>
+          <p:nvPr/>
+        </p:nvCxnSpPr>
+        <p:spPr>
+          <a:xfrm flipH="1">
+            <a:off x="4753134" y="4302388"/>
+            <a:ext cx="864284" cy="854804"/>
+          </a:xfrm>
+          <a:prstGeom prst="straightConnector1">
+            <a:avLst/>
+          </a:prstGeom>
+          <a:ln>
+            <a:headEnd type="arrow"/>
+            <a:tailEnd type="arrow"/>
+          </a:ln>
+        </p:spPr>
+        <p:style>
+          <a:lnRef idx="1">
+            <a:schemeClr val="accent1"/>
+          </a:lnRef>
+          <a:fillRef idx="0">
+            <a:schemeClr val="accent1"/>
+          </a:fillRef>
+          <a:effectRef idx="0">
+            <a:schemeClr val="accent1"/>
+          </a:effectRef>
+          <a:fontRef idx="minor">
+            <a:schemeClr val="tx1"/>
+          </a:fontRef>
+        </p:style>
+      </p:cxnSp>
+      <p:sp>
+        <p:nvSpPr>
+          <p:cNvPr id="217" name="Прямоугольник 216"/>
+          <p:cNvSpPr/>
+          <p:nvPr/>
+        </p:nvSpPr>
+        <p:spPr>
+          <a:xfrm>
+            <a:off x="6660232" y="4005064"/>
+            <a:ext cx="2249338" cy="1477328"/>
+          </a:xfrm>
+          <a:prstGeom prst="rect">
+            <a:avLst/>
+          </a:prstGeom>
+        </p:spPr>
+        <p:style>
+          <a:lnRef idx="2">
+            <a:schemeClr val="accent1"/>
+          </a:lnRef>
+          <a:fillRef idx="1">
+            <a:schemeClr val="lt1"/>
+          </a:fillRef>
+          <a:effectRef idx="0">
+            <a:schemeClr val="accent1"/>
+          </a:effectRef>
+          <a:fontRef idx="minor">
+            <a:schemeClr val="dk1"/>
+          </a:fontRef>
+        </p:style>
+        <p:txBody>
+          <a:bodyPr wrap="square">
+            <a:spAutoFit/>
+          </a:bodyPr>
+          <a:lstStyle/>
+          <a:p>
+            <a:r>
+              <a:rPr lang="en-US" dirty="0" smtClean="0"/>
+              <a:t>java.net,</a:t>
+            </a:r>
+          </a:p>
+          <a:p>
+            <a:r>
+              <a:rPr lang="en-US" dirty="0" smtClean="0"/>
+              <a:t>Hibernate, </a:t>
+            </a:r>
+            <a:r>
+              <a:rPr lang="en-US" dirty="0" err="1" smtClean="0"/>
+              <a:t>com.google.android.gms.maps</a:t>
+            </a:r>
+            <a:r>
+              <a:rPr lang="en-US" dirty="0" smtClean="0"/>
+              <a:t>, </a:t>
+            </a:r>
+          </a:p>
+          <a:p>
+            <a:r>
+              <a:rPr lang="en-US" dirty="0" smtClean="0"/>
+              <a:t>android</a:t>
+            </a:r>
+          </a:p>
+        </p:txBody>
+      </p:sp>
+      <p:sp>
+        <p:nvSpPr>
+          <p:cNvPr id="219" name="TextBox 218"/>
+          <p:cNvSpPr txBox="1"/>
+          <p:nvPr/>
+        </p:nvSpPr>
+        <p:spPr>
+          <a:xfrm>
+            <a:off x="6660232" y="3645024"/>
+            <a:ext cx="2232248" cy="369332"/>
+          </a:xfrm>
+          <a:prstGeom prst="rect">
+            <a:avLst/>
+          </a:prstGeom>
+        </p:spPr>
+        <p:style>
+          <a:lnRef idx="2">
+            <a:schemeClr val="accent1"/>
+          </a:lnRef>
+          <a:fillRef idx="1">
+            <a:schemeClr val="lt1"/>
+          </a:fillRef>
+          <a:effectRef idx="0">
+            <a:schemeClr val="accent1"/>
+          </a:effectRef>
+          <a:fontRef idx="minor">
+            <a:schemeClr val="dk1"/>
+          </a:fontRef>
+        </p:style>
+        <p:txBody>
           <a:bodyPr wrap="square" rtlCol="0">
             <a:spAutoFit/>
           </a:bodyPr>
@@ -3552,85 +4854,9 @@
           <a:p>
             <a:r>
               <a:rPr lang="ru-RU" dirty="0" smtClean="0"/>
-              <a:t>Савушкин Алексей:</a:t>
-            </a:r>
-          </a:p>
-          <a:p>
-            <a:pPr>
-              <a:buFont typeface="Arial" pitchFamily="34" charset="0"/>
-              <a:buChar char="•"/>
-            </a:pPr>
-            <a:r>
-              <a:rPr lang="ru-RU" dirty="0" smtClean="0"/>
-              <a:t>Библиотеки:</a:t>
-            </a:r>
-          </a:p>
-          <a:p>
-            <a:pPr>
-              <a:buFont typeface="Arial" pitchFamily="34" charset="0"/>
-              <a:buChar char="•"/>
-            </a:pPr>
-            <a:r>
-              <a:rPr lang="ru-RU" dirty="0" smtClean="0"/>
-              <a:t>Классы:</a:t>
-            </a:r>
-            <a:r>
-              <a:rPr lang="en-US" dirty="0" smtClean="0"/>
-              <a:t>Activity</a:t>
-            </a:r>
-            <a:endParaRPr lang="ru-RU" dirty="0" smtClean="0"/>
-          </a:p>
-          <a:p>
-            <a:pPr>
-              <a:buFont typeface="Arial" pitchFamily="34" charset="0"/>
-              <a:buChar char="•"/>
-            </a:pPr>
-            <a:r>
-              <a:rPr lang="ru-RU" dirty="0" smtClean="0"/>
-              <a:t>Методы:</a:t>
-            </a:r>
-            <a:r>
-              <a:rPr lang="en-US" dirty="0" err="1" smtClean="0"/>
-              <a:t>onCreate</a:t>
-            </a:r>
-            <a:r>
-              <a:rPr lang="en-US" dirty="0" smtClean="0"/>
-              <a:t>,</a:t>
-            </a:r>
-          </a:p>
-          <a:p>
-            <a:r>
-              <a:rPr lang="en-US" dirty="0" err="1" smtClean="0"/>
-              <a:t>setButton</a:t>
-            </a:r>
-            <a:r>
-              <a:rPr lang="en-US" dirty="0" smtClean="0"/>
-              <a:t>, </a:t>
-            </a:r>
-            <a:r>
-              <a:rPr lang="en-US" dirty="0" err="1" smtClean="0"/>
-              <a:t>findViewById</a:t>
-            </a:r>
-            <a:r>
-              <a:rPr lang="en-US" dirty="0" smtClean="0"/>
-              <a:t>, </a:t>
-            </a:r>
-            <a:r>
-              <a:rPr lang="en-US" dirty="0" err="1" smtClean="0"/>
-              <a:t>setText</a:t>
-            </a:r>
-            <a:r>
-              <a:rPr lang="en-US" dirty="0" smtClean="0"/>
-              <a:t>, </a:t>
-            </a:r>
-            <a:r>
-              <a:rPr lang="en-US" dirty="0" err="1" smtClean="0"/>
-              <a:t>setOnClickListener</a:t>
+              <a:t>Библиотеки</a:t>
             </a:r>
             <a:endParaRPr lang="en-US" dirty="0" smtClean="0"/>
-          </a:p>
-          <a:p>
-            <a:endParaRPr lang="ru-RU" dirty="0"/>
           </a:p>
         </p:txBody>
       </p:sp>

</xml_diff>